<commit_message>
start presentation need to develop
</commit_message>
<xml_diff>
--- a/Presentation.pptx
+++ b/Presentation.pptx
@@ -5,7 +5,7 @@
     <p:sldMasterId id="2147483648" r:id="rId1"/>
   </p:sldMasterIdLst>
   <p:notesMasterIdLst>
-    <p:notesMasterId r:id="rId26"/>
+    <p:notesMasterId r:id="rId25"/>
   </p:notesMasterIdLst>
   <p:sldIdLst>
     <p:sldId id="280" r:id="rId2"/>
@@ -22,16 +22,15 @@
     <p:sldId id="271" r:id="rId13"/>
     <p:sldId id="272" r:id="rId14"/>
     <p:sldId id="273" r:id="rId15"/>
-    <p:sldId id="256" r:id="rId16"/>
-    <p:sldId id="257" r:id="rId17"/>
-    <p:sldId id="258" r:id="rId18"/>
-    <p:sldId id="259" r:id="rId19"/>
-    <p:sldId id="279" r:id="rId20"/>
-    <p:sldId id="274" r:id="rId21"/>
-    <p:sldId id="275" r:id="rId22"/>
-    <p:sldId id="276" r:id="rId23"/>
-    <p:sldId id="277" r:id="rId24"/>
-    <p:sldId id="278" r:id="rId25"/>
+    <p:sldId id="257" r:id="rId16"/>
+    <p:sldId id="258" r:id="rId17"/>
+    <p:sldId id="259" r:id="rId18"/>
+    <p:sldId id="279" r:id="rId19"/>
+    <p:sldId id="274" r:id="rId20"/>
+    <p:sldId id="275" r:id="rId21"/>
+    <p:sldId id="276" r:id="rId22"/>
+    <p:sldId id="277" r:id="rId23"/>
+    <p:sldId id="278" r:id="rId24"/>
   </p:sldIdLst>
   <p:sldSz cx="12192000" cy="6858000"/>
   <p:notesSz cx="6858000" cy="9144000"/>
@@ -136,11 +135,11 @@
         <p14:section name="Default Section" id="{345CD9CA-7C87-4C48-8721-B7BC43F3DEFE}">
           <p14:sldIdLst>
             <p14:sldId id="280"/>
+            <p14:sldId id="260"/>
           </p14:sldIdLst>
         </p14:section>
         <p14:section name="Problématique" id="{8C2EB197-87EF-4613-B906-475B540A5409}">
           <p14:sldIdLst>
-            <p14:sldId id="260"/>
             <p14:sldId id="261"/>
             <p14:sldId id="263"/>
           </p14:sldIdLst>
@@ -161,7 +160,6 @@
         </p14:section>
         <p14:section name="Solution" id="{D707B3D0-2C99-4931-BB31-A46AE0A5FB61}">
           <p14:sldIdLst>
-            <p14:sldId id="256"/>
             <p14:sldId id="257"/>
             <p14:sldId id="258"/>
             <p14:sldId id="259"/>
@@ -586,6 +584,30 @@
         <p:txBody>
           <a:bodyPr/>
           <a:lstStyle/>
+          <a:p>
+            <a:pPr marL="0" marR="0" lvl="0" indent="0" algn="l" defTabSz="914400" rtl="0" eaLnBrk="1" fontAlgn="auto" latinLnBrk="0" hangingPunct="1">
+              <a:lnSpc>
+                <a:spcPct val="100000"/>
+              </a:lnSpc>
+              <a:spcBef>
+                <a:spcPts val="0"/>
+              </a:spcBef>
+              <a:spcAft>
+                <a:spcPts val="0"/>
+              </a:spcAft>
+              <a:buClrTx/>
+              <a:buSzTx/>
+              <a:buFontTx/>
+              <a:buNone/>
+              <a:tabLst/>
+              <a:defRPr/>
+            </a:pPr>
+            <a:r>
+              <a:rPr lang="fr-FR" dirty="0"/>
+              <a:t>ESTHETIQUE AUTO NORD SUD TÉTOUAN est une entreprise de lavage auto haute qualité et précise avec une large gamme de produits et services à la carte pour ses clients. l'entreprise a besoin d’un site web pour élargir sa présence dans le web, communiquer à propos de nouveautés de ses produits et services et permettre au client de réserver un créneau pour bénéficier de ses services sans se déplace.</a:t>
+            </a:r>
+            <a:endParaRPr lang="en-US" dirty="0"/>
+          </a:p>
           <a:p>
             <a:endParaRPr lang="en-US" dirty="0"/>
           </a:p>
@@ -4878,115 +4900,6 @@
           <a:chExt cx="0" cy="0"/>
         </a:xfrm>
       </p:grpSpPr>
-      <p:sp>
-        <p:nvSpPr>
-          <p:cNvPr id="2" name="Title 1">
-            <a:extLst>
-              <a:ext uri="{FF2B5EF4-FFF2-40B4-BE49-F238E27FC236}">
-                <a16:creationId xmlns:a16="http://schemas.microsoft.com/office/drawing/2014/main" id="{7BC4BE43-5DB9-4FC8-8B71-A797DAC5C648}"/>
-              </a:ext>
-            </a:extLst>
-          </p:cNvPr>
-          <p:cNvSpPr>
-            <a:spLocks noGrp="1"/>
-          </p:cNvSpPr>
-          <p:nvPr>
-            <p:ph type="ctrTitle"/>
-          </p:nvPr>
-        </p:nvSpPr>
-        <p:spPr/>
-        <p:txBody>
-          <a:bodyPr/>
-          <a:lstStyle/>
-          <a:p>
-            <a:r>
-              <a:rPr lang="fr-FR" dirty="0"/>
-              <a:t>Workflow git</a:t>
-            </a:r>
-            <a:endParaRPr lang="en-US" dirty="0"/>
-          </a:p>
-        </p:txBody>
-      </p:sp>
-      <p:sp>
-        <p:nvSpPr>
-          <p:cNvPr id="3" name="Subtitle 2">
-            <a:extLst>
-              <a:ext uri="{FF2B5EF4-FFF2-40B4-BE49-F238E27FC236}">
-                <a16:creationId xmlns:a16="http://schemas.microsoft.com/office/drawing/2014/main" id="{33681FF5-50F5-4258-899A-976195769244}"/>
-              </a:ext>
-            </a:extLst>
-          </p:cNvPr>
-          <p:cNvSpPr>
-            <a:spLocks noGrp="1"/>
-          </p:cNvSpPr>
-          <p:nvPr>
-            <p:ph type="subTitle" idx="1"/>
-          </p:nvPr>
-        </p:nvSpPr>
-        <p:spPr/>
-        <p:txBody>
-          <a:bodyPr/>
-          <a:lstStyle/>
-          <a:p>
-            <a:endParaRPr lang="en-US"/>
-          </a:p>
-        </p:txBody>
-      </p:sp>
-    </p:spTree>
-    <p:extLst>
-      <p:ext uri="{BB962C8B-B14F-4D97-AF65-F5344CB8AC3E}">
-        <p14:creationId xmlns:p14="http://schemas.microsoft.com/office/powerpoint/2010/main" val="3223147570"/>
-      </p:ext>
-    </p:extLst>
-  </p:cSld>
-  <p:clrMapOvr>
-    <a:masterClrMapping/>
-  </p:clrMapOvr>
-</p:sld>
-</file>
-
-<file path=ppt/slides/slide16.xml><?xml version="1.0" encoding="utf-8"?>
-<p:sld xmlns:a="http://schemas.openxmlformats.org/drawingml/2006/main" xmlns:r="http://schemas.openxmlformats.org/officeDocument/2006/relationships" xmlns:p="http://schemas.openxmlformats.org/presentationml/2006/main">
-  <p:cSld>
-    <p:spTree>
-      <p:nvGrpSpPr>
-        <p:cNvPr id="1" name=""/>
-        <p:cNvGrpSpPr/>
-        <p:nvPr/>
-      </p:nvGrpSpPr>
-      <p:grpSpPr>
-        <a:xfrm>
-          <a:off x="0" y="0"/>
-          <a:ext cx="0" cy="0"/>
-          <a:chOff x="0" y="0"/>
-          <a:chExt cx="0" cy="0"/>
-        </a:xfrm>
-      </p:grpSpPr>
-      <p:sp>
-        <p:nvSpPr>
-          <p:cNvPr id="2" name="Title 1">
-            <a:extLst>
-              <a:ext uri="{FF2B5EF4-FFF2-40B4-BE49-F238E27FC236}">
-                <a16:creationId xmlns:a16="http://schemas.microsoft.com/office/drawing/2014/main" id="{A1078DC7-C1F4-4B11-86D8-BF2B91A1F55A}"/>
-              </a:ext>
-            </a:extLst>
-          </p:cNvPr>
-          <p:cNvSpPr>
-            <a:spLocks noGrp="1"/>
-          </p:cNvSpPr>
-          <p:nvPr>
-            <p:ph type="title"/>
-          </p:nvPr>
-        </p:nvSpPr>
-        <p:spPr/>
-        <p:txBody>
-          <a:bodyPr/>
-          <a:lstStyle/>
-          <a:p>
-            <a:endParaRPr lang="en-US"/>
-          </a:p>
-        </p:txBody>
-      </p:sp>
       <p:pic>
         <p:nvPicPr>
           <p:cNvPr id="4" name="Content Placeholder 3">
@@ -5019,6 +4932,40 @@
           </a:prstGeom>
         </p:spPr>
       </p:pic>
+      <p:sp>
+        <p:nvSpPr>
+          <p:cNvPr id="5" name="Title 1">
+            <a:extLst>
+              <a:ext uri="{FF2B5EF4-FFF2-40B4-BE49-F238E27FC236}">
+                <a16:creationId xmlns:a16="http://schemas.microsoft.com/office/drawing/2014/main" id="{10E025D2-9C65-4D6A-A1EB-0C3EDD720770}"/>
+              </a:ext>
+            </a:extLst>
+          </p:cNvPr>
+          <p:cNvSpPr>
+            <a:spLocks noGrp="1"/>
+          </p:cNvSpPr>
+          <p:nvPr>
+            <p:ph type="title"/>
+          </p:nvPr>
+        </p:nvSpPr>
+        <p:spPr>
+          <a:xfrm>
+            <a:off x="838200" y="365125"/>
+            <a:ext cx="10515600" cy="1325563"/>
+          </a:xfrm>
+        </p:spPr>
+        <p:txBody>
+          <a:bodyPr/>
+          <a:lstStyle/>
+          <a:p>
+            <a:r>
+              <a:rPr lang="fr-FR" dirty="0"/>
+              <a:t>Workflow git</a:t>
+            </a:r>
+            <a:endParaRPr lang="en-US" dirty="0"/>
+          </a:p>
+        </p:txBody>
+      </p:sp>
     </p:spTree>
     <p:extLst>
       <p:ext uri="{BB962C8B-B14F-4D97-AF65-F5344CB8AC3E}">
@@ -5032,7 +4979,7 @@
 </p:sld>
 </file>
 
-<file path=ppt/slides/slide17.xml><?xml version="1.0" encoding="utf-8"?>
+<file path=ppt/slides/slide16.xml><?xml version="1.0" encoding="utf-8"?>
 <p:sld xmlns:a="http://schemas.openxmlformats.org/drawingml/2006/main" xmlns:r="http://schemas.openxmlformats.org/officeDocument/2006/relationships" xmlns:p="http://schemas.openxmlformats.org/presentationml/2006/main">
   <p:cSld>
     <p:spTree>
@@ -5119,7 +5066,7 @@
 </p:sld>
 </file>
 
-<file path=ppt/slides/slide18.xml><?xml version="1.0" encoding="utf-8"?>
+<file path=ppt/slides/slide17.xml><?xml version="1.0" encoding="utf-8"?>
 <p:sld xmlns:a="http://schemas.openxmlformats.org/drawingml/2006/main" xmlns:r="http://schemas.openxmlformats.org/officeDocument/2006/relationships" xmlns:p="http://schemas.openxmlformats.org/presentationml/2006/main">
   <p:cSld>
     <p:spTree>
@@ -5206,6 +5153,98 @@
 </p:sld>
 </file>
 
+<file path=ppt/slides/slide18.xml><?xml version="1.0" encoding="utf-8"?>
+<p:sld xmlns:a="http://schemas.openxmlformats.org/drawingml/2006/main" xmlns:r="http://schemas.openxmlformats.org/officeDocument/2006/relationships" xmlns:p="http://schemas.openxmlformats.org/presentationml/2006/main">
+  <p:cSld>
+    <p:spTree>
+      <p:nvGrpSpPr>
+        <p:cNvPr id="1" name=""/>
+        <p:cNvGrpSpPr/>
+        <p:nvPr/>
+      </p:nvGrpSpPr>
+      <p:grpSpPr>
+        <a:xfrm>
+          <a:off x="0" y="0"/>
+          <a:ext cx="0" cy="0"/>
+          <a:chOff x="0" y="0"/>
+          <a:chExt cx="0" cy="0"/>
+        </a:xfrm>
+      </p:grpSpPr>
+      <p:sp>
+        <p:nvSpPr>
+          <p:cNvPr id="2" name="Title 1">
+            <a:extLst>
+              <a:ext uri="{FF2B5EF4-FFF2-40B4-BE49-F238E27FC236}">
+                <a16:creationId xmlns:a16="http://schemas.microsoft.com/office/drawing/2014/main" id="{37A2F77F-94CF-47E9-BAA8-97B926B8429F}"/>
+              </a:ext>
+            </a:extLst>
+          </p:cNvPr>
+          <p:cNvSpPr>
+            <a:spLocks noGrp="1"/>
+          </p:cNvSpPr>
+          <p:nvPr>
+            <p:ph type="title"/>
+          </p:nvPr>
+        </p:nvSpPr>
+        <p:spPr/>
+        <p:txBody>
+          <a:bodyPr/>
+          <a:lstStyle/>
+          <a:p>
+            <a:r>
+              <a:rPr lang="fr-FR" dirty="0"/>
+              <a:t>Plateforme Finale</a:t>
+            </a:r>
+            <a:endParaRPr lang="en-US" dirty="0"/>
+          </a:p>
+        </p:txBody>
+      </p:sp>
+      <p:pic>
+        <p:nvPicPr>
+          <p:cNvPr id="4" name="Content Placeholder 3">
+            <a:hlinkClick r:id="rId2"/>
+            <a:extLst>
+              <a:ext uri="{FF2B5EF4-FFF2-40B4-BE49-F238E27FC236}">
+                <a16:creationId xmlns:a16="http://schemas.microsoft.com/office/drawing/2014/main" id="{5628FA53-407A-4202-8ACD-835A0F4C7C7A}"/>
+              </a:ext>
+            </a:extLst>
+          </p:cNvPr>
+          <p:cNvPicPr>
+            <a:picLocks noGrp="1" noChangeAspect="1"/>
+          </p:cNvPicPr>
+          <p:nvPr>
+            <p:ph idx="1"/>
+          </p:nvPr>
+        </p:nvPicPr>
+        <p:blipFill>
+          <a:blip r:embed="rId3"/>
+          <a:stretch>
+            <a:fillRect/>
+          </a:stretch>
+        </p:blipFill>
+        <p:spPr>
+          <a:xfrm>
+            <a:off x="1341871" y="1690688"/>
+            <a:ext cx="9228340" cy="4351338"/>
+          </a:xfrm>
+          <a:prstGeom prst="rect">
+            <a:avLst/>
+          </a:prstGeom>
+        </p:spPr>
+      </p:pic>
+    </p:spTree>
+    <p:extLst>
+      <p:ext uri="{BB962C8B-B14F-4D97-AF65-F5344CB8AC3E}">
+        <p14:creationId xmlns:p14="http://schemas.microsoft.com/office/powerpoint/2010/main" val="1515925852"/>
+      </p:ext>
+    </p:extLst>
+  </p:cSld>
+  <p:clrMapOvr>
+    <a:masterClrMapping/>
+  </p:clrMapOvr>
+</p:sld>
+</file>
+
 <file path=ppt/slides/slide19.xml><?xml version="1.0" encoding="utf-8"?>
 <p:sld xmlns:a="http://schemas.openxmlformats.org/drawingml/2006/main" xmlns:r="http://schemas.openxmlformats.org/officeDocument/2006/relationships" xmlns:p="http://schemas.openxmlformats.org/presentationml/2006/main">
   <p:cSld>
@@ -5228,7 +5267,7 @@
           <p:cNvPr id="2" name="Title 1">
             <a:extLst>
               <a:ext uri="{FF2B5EF4-FFF2-40B4-BE49-F238E27FC236}">
-                <a16:creationId xmlns:a16="http://schemas.microsoft.com/office/drawing/2014/main" id="{37A2F77F-94CF-47E9-BAA8-97B926B8429F}"/>
+                <a16:creationId xmlns:a16="http://schemas.microsoft.com/office/drawing/2014/main" id="{3F141821-B6E6-4D6C-8F24-63BE3BAE8215}"/>
               </a:ext>
             </a:extLst>
           </p:cNvPr>
@@ -5253,7 +5292,7 @@
           <p:cNvPr id="3" name="Content Placeholder 2">
             <a:extLst>
               <a:ext uri="{FF2B5EF4-FFF2-40B4-BE49-F238E27FC236}">
-                <a16:creationId xmlns:a16="http://schemas.microsoft.com/office/drawing/2014/main" id="{6B75C196-4F04-4A05-8319-B8505375F4EF}"/>
+                <a16:creationId xmlns:a16="http://schemas.microsoft.com/office/drawing/2014/main" id="{AF34B08F-F05E-4F01-BA9C-5949C3EBF18A}"/>
               </a:ext>
             </a:extLst>
           </p:cNvPr>
@@ -5276,7 +5315,7 @@
     </p:spTree>
     <p:extLst>
       <p:ext uri="{BB962C8B-B14F-4D97-AF65-F5344CB8AC3E}">
-        <p14:creationId xmlns:p14="http://schemas.microsoft.com/office/powerpoint/2010/main" val="1515925852"/>
+        <p14:creationId xmlns:p14="http://schemas.microsoft.com/office/powerpoint/2010/main" val="2293353658"/>
       </p:ext>
     </p:extLst>
   </p:cSld>
@@ -5348,13 +5387,22 @@
             <p:ph idx="1"/>
           </p:nvPr>
         </p:nvSpPr>
-        <p:spPr/>
+        <p:spPr>
+          <a:xfrm>
+            <a:off x="838200" y="1825625"/>
+            <a:ext cx="10515600" cy="4351338"/>
+          </a:xfrm>
+        </p:spPr>
         <p:txBody>
           <a:bodyPr>
-            <a:normAutofit fontScale="40000" lnSpcReduction="20000"/>
+            <a:normAutofit fontScale="85000" lnSpcReduction="20000"/>
           </a:bodyPr>
           <a:lstStyle/>
           <a:p>
+            <a:pPr marL="514350" indent="-514350">
+              <a:buFont typeface="+mj-lt"/>
+              <a:buAutoNum type="arabicPeriod"/>
+            </a:pPr>
             <a:r>
               <a:rPr lang="fr-FR" b="1" dirty="0"/>
               <a:t>Problématique</a:t>
@@ -5362,6 +5410,10 @@
             <a:endParaRPr lang="en-US" b="1" dirty="0"/>
           </a:p>
           <a:p>
+            <a:pPr marL="971550" lvl="1" indent="-514350">
+              <a:buFont typeface="+mj-lt"/>
+              <a:buAutoNum type="arabicPeriod"/>
+            </a:pPr>
             <a:r>
               <a:rPr lang="fr-FR" dirty="0"/>
               <a:t>Description de cahier de charge ( de préférence schématisé)</a:t>
@@ -5369,6 +5421,10 @@
             <a:endParaRPr lang="en-US" dirty="0"/>
           </a:p>
           <a:p>
+            <a:pPr marL="514350" indent="-514350">
+              <a:buFont typeface="+mj-lt"/>
+              <a:buAutoNum type="arabicPeriod"/>
+            </a:pPr>
             <a:r>
               <a:rPr lang="fr-FR" b="1" dirty="0"/>
               <a:t>Conception et Modélisation</a:t>
@@ -5376,7 +5432,10 @@
             <a:endParaRPr lang="en-US" b="1" dirty="0"/>
           </a:p>
           <a:p>
-            <a:pPr lvl="0"/>
+            <a:pPr marL="971550" lvl="1" indent="-514350">
+              <a:buFont typeface="+mj-lt"/>
+              <a:buAutoNum type="arabicPeriod"/>
+            </a:pPr>
             <a:r>
               <a:rPr lang="fr-FR" dirty="0"/>
               <a:t>Diagramme de cas d’utilisation </a:t>
@@ -5384,7 +5443,30 @@
             <a:endParaRPr lang="en-US" dirty="0"/>
           </a:p>
           <a:p>
-            <a:pPr lvl="0"/>
+            <a:pPr marL="971550" lvl="1" indent="-514350">
+              <a:buFont typeface="+mj-lt"/>
+              <a:buAutoNum type="arabicPeriod"/>
+            </a:pPr>
+            <a:r>
+              <a:rPr lang="fr-FR" dirty="0"/>
+              <a:t>Diagramme de classe</a:t>
+            </a:r>
+          </a:p>
+          <a:p>
+            <a:pPr marL="971550" lvl="1" indent="-514350">
+              <a:buFont typeface="+mj-lt"/>
+              <a:buAutoNum type="arabicPeriod"/>
+            </a:pPr>
+            <a:r>
+              <a:rPr lang="fr-FR" dirty="0"/>
+              <a:t>UML ERD</a:t>
+            </a:r>
+          </a:p>
+          <a:p>
+            <a:pPr marL="971550" lvl="1" indent="-514350">
+              <a:buFont typeface="+mj-lt"/>
+              <a:buAutoNum type="arabicPeriod"/>
+            </a:pPr>
             <a:r>
               <a:rPr lang="fr-FR" dirty="0"/>
               <a:t>Diagramme de séquence</a:t>
@@ -5392,56 +5474,21 @@
             <a:endParaRPr lang="en-US" dirty="0"/>
           </a:p>
           <a:p>
-            <a:pPr lvl="0"/>
-            <a:r>
-              <a:rPr lang="fr-FR" dirty="0"/>
-              <a:t>Diagramme de classe</a:t>
-            </a:r>
-            <a:endParaRPr lang="en-US" dirty="0"/>
-          </a:p>
-          <a:p>
-            <a:pPr lvl="0"/>
-            <a:r>
-              <a:rPr lang="fr-FR" dirty="0"/>
-              <a:t>Merise (MCD/MLD)</a:t>
-            </a:r>
-            <a:endParaRPr lang="en-US" dirty="0"/>
-          </a:p>
-          <a:p>
+            <a:pPr marL="514350" indent="-514350">
+              <a:buFont typeface="+mj-lt"/>
+              <a:buAutoNum type="arabicPeriod"/>
+            </a:pPr>
             <a:r>
               <a:rPr lang="fr-FR" b="1" dirty="0"/>
-              <a:t>NB </a:t>
-            </a:r>
-            <a:r>
-              <a:rPr lang="fr-FR" dirty="0"/>
-              <a:t>: Vous pouvez présenter soit UML ou Merise </a:t>
-            </a:r>
-            <a:endParaRPr lang="en-US" dirty="0"/>
-          </a:p>
-          <a:p>
-            <a:r>
-              <a:rPr lang="fr-FR" b="1" dirty="0"/>
-              <a:t> Maquettage</a:t>
+              <a:t>Maquettage</a:t>
             </a:r>
             <a:endParaRPr lang="en-US" b="1" dirty="0"/>
           </a:p>
           <a:p>
-            <a:pPr lvl="0"/>
-            <a:r>
-              <a:rPr lang="fr-FR" dirty="0"/>
-              <a:t>Maquette sous adobe </a:t>
-            </a:r>
-            <a:r>
-              <a:rPr lang="fr-FR" dirty="0" err="1"/>
-              <a:t>xd</a:t>
-            </a:r>
-            <a:r>
-              <a:rPr lang="fr-FR" dirty="0"/>
-              <a:t> ou autre (2 pages au maximum)</a:t>
-            </a:r>
-            <a:endParaRPr lang="en-US" dirty="0"/>
-          </a:p>
-          <a:p>
+            <a:pPr marL="514350" indent="-514350">
+              <a:buFont typeface="+mj-lt"/>
+              <a:buAutoNum type="arabicPeriod"/>
+            </a:pPr>
             <a:r>
               <a:rPr lang="fr-FR" b="1" dirty="0"/>
               <a:t>Présentation du Solution</a:t>
@@ -5449,7 +5496,10 @@
             <a:endParaRPr lang="en-US" b="1" dirty="0"/>
           </a:p>
           <a:p>
-            <a:pPr lvl="0"/>
+            <a:pPr marL="514350" lvl="0" indent="-514350">
+              <a:buFont typeface="+mj-lt"/>
+              <a:buAutoNum type="arabicPeriod"/>
+            </a:pPr>
             <a:r>
               <a:rPr lang="fr-FR" dirty="0"/>
               <a:t>Présentation le workflow du projet et modalité de travail</a:t>
@@ -5457,7 +5507,10 @@
             <a:endParaRPr lang="en-US" dirty="0"/>
           </a:p>
           <a:p>
-            <a:pPr lvl="0"/>
+            <a:pPr marL="514350" lvl="0" indent="-514350">
+              <a:buFont typeface="+mj-lt"/>
+              <a:buAutoNum type="arabicPeriod"/>
+            </a:pPr>
             <a:r>
               <a:rPr lang="fr-FR" dirty="0"/>
               <a:t>Présentation de la plateforme finale</a:t>
@@ -5465,33 +5518,15 @@
             <a:endParaRPr lang="en-US" dirty="0"/>
           </a:p>
           <a:p>
-            <a:pPr lvl="0"/>
-            <a:r>
-              <a:rPr lang="fr-FR" dirty="0"/>
-              <a:t>Explication du code (la partie importante dans le projet)</a:t>
-            </a:r>
-            <a:endParaRPr lang="en-US" dirty="0"/>
-          </a:p>
-          <a:p>
+            <a:pPr marL="514350" indent="-514350">
+              <a:buFont typeface="+mj-lt"/>
+              <a:buAutoNum type="arabicPeriod"/>
+            </a:pPr>
             <a:r>
               <a:rPr lang="fr-FR" b="1" dirty="0"/>
               <a:t>Conclusion et Perspectives </a:t>
             </a:r>
             <a:endParaRPr lang="en-US" b="1" dirty="0"/>
-          </a:p>
-          <a:p>
-            <a:r>
-              <a:rPr lang="fr-FR" i="1" dirty="0"/>
-              <a:t>Une synthèse du travail, ainsi que les parties qui restent à développer. </a:t>
-            </a:r>
-            <a:endParaRPr lang="en-US" dirty="0"/>
-          </a:p>
-          <a:p>
-            <a:r>
-              <a:rPr lang="fr-FR" i="1" dirty="0"/>
-              <a:t>Pour les compétences CMS / E-commerce, il faut préparer le lien vers le brief projet. </a:t>
-            </a:r>
-            <a:endParaRPr lang="en-US" dirty="0"/>
           </a:p>
           <a:p>
             <a:endParaRPr lang="en-US" dirty="0"/>
@@ -5533,7 +5568,7 @@
           <p:cNvPr id="2" name="Title 1">
             <a:extLst>
               <a:ext uri="{FF2B5EF4-FFF2-40B4-BE49-F238E27FC236}">
-                <a16:creationId xmlns:a16="http://schemas.microsoft.com/office/drawing/2014/main" id="{3F141821-B6E6-4D6C-8F24-63BE3BAE8215}"/>
+                <a16:creationId xmlns:a16="http://schemas.microsoft.com/office/drawing/2014/main" id="{4D1FD0C4-3788-473B-9262-DE933F314C9B}"/>
               </a:ext>
             </a:extLst>
           </p:cNvPr>
@@ -5549,7 +5584,11 @@
           <a:bodyPr/>
           <a:lstStyle/>
           <a:p>
-            <a:endParaRPr lang="en-US"/>
+            <a:r>
+              <a:rPr lang="fr-FR" dirty="0"/>
+              <a:t>Conclusion et perspectives</a:t>
+            </a:r>
+            <a:endParaRPr lang="en-US" dirty="0"/>
           </a:p>
         </p:txBody>
       </p:sp>
@@ -5558,7 +5597,7 @@
           <p:cNvPr id="3" name="Content Placeholder 2">
             <a:extLst>
               <a:ext uri="{FF2B5EF4-FFF2-40B4-BE49-F238E27FC236}">
-                <a16:creationId xmlns:a16="http://schemas.microsoft.com/office/drawing/2014/main" id="{AF34B08F-F05E-4F01-BA9C-5949C3EBF18A}"/>
+                <a16:creationId xmlns:a16="http://schemas.microsoft.com/office/drawing/2014/main" id="{8BC5174E-5CE4-40EB-AC41-9F2196CC07BD}"/>
               </a:ext>
             </a:extLst>
           </p:cNvPr>
@@ -5574,14 +5613,55 @@
           <a:bodyPr/>
           <a:lstStyle/>
           <a:p>
-            <a:endParaRPr lang="en-US"/>
+            <a:r>
+              <a:rPr lang="fr-FR" dirty="0" err="1"/>
+              <a:t>Protech</a:t>
+            </a:r>
+            <a:r>
+              <a:rPr lang="fr-FR" dirty="0"/>
+              <a:t> Tétouan représenté a fait un retour positif sur le produit final et compte le déployer le plus tôt possible ( réunion sera programmé en Novembre)</a:t>
+            </a:r>
+          </a:p>
+          <a:p>
+            <a:r>
+              <a:rPr lang="fr-FR" dirty="0"/>
+              <a:t>L’application de réservation est en version beta on compte l’essayer un moment après déploiement avant de faire des modifications selon le retour des utilisateurs (associées </a:t>
+            </a:r>
+            <a:r>
+              <a:rPr lang="fr-FR" dirty="0" err="1"/>
+              <a:t>Protech</a:t>
+            </a:r>
+            <a:r>
+              <a:rPr lang="fr-FR" dirty="0"/>
+              <a:t> </a:t>
+            </a:r>
+            <a:r>
+              <a:rPr lang="fr-FR" dirty="0" err="1"/>
+              <a:t>Tetouan</a:t>
+            </a:r>
+            <a:r>
+              <a:rPr lang="fr-FR" dirty="0"/>
+              <a:t> et ses clients)</a:t>
+            </a:r>
+          </a:p>
+          <a:p>
+            <a:r>
+              <a:rPr lang="fr-FR" dirty="0"/>
+              <a:t>Ajouter une application de chat live ( réunion sera programmé en Novembre)</a:t>
+            </a:r>
+          </a:p>
+          <a:p>
+            <a:pPr marL="0" indent="0">
+              <a:buNone/>
+            </a:pPr>
+            <a:endParaRPr lang="en-US" dirty="0"/>
           </a:p>
         </p:txBody>
       </p:sp>
     </p:spTree>
     <p:extLst>
       <p:ext uri="{BB962C8B-B14F-4D97-AF65-F5344CB8AC3E}">
-        <p14:creationId xmlns:p14="http://schemas.microsoft.com/office/powerpoint/2010/main" val="2293353658"/>
+        <p14:creationId xmlns:p14="http://schemas.microsoft.com/office/powerpoint/2010/main" val="986161817"/>
       </p:ext>
     </p:extLst>
   </p:cSld>
@@ -5613,7 +5693,7 @@
           <p:cNvPr id="2" name="Title 1">
             <a:extLst>
               <a:ext uri="{FF2B5EF4-FFF2-40B4-BE49-F238E27FC236}">
-                <a16:creationId xmlns:a16="http://schemas.microsoft.com/office/drawing/2014/main" id="{4D1FD0C4-3788-473B-9262-DE933F314C9B}"/>
+                <a16:creationId xmlns:a16="http://schemas.microsoft.com/office/drawing/2014/main" id="{99B0CD23-D85F-474F-88DD-9651CE5BE134}"/>
               </a:ext>
             </a:extLst>
           </p:cNvPr>
@@ -5629,7 +5709,11 @@
           <a:bodyPr/>
           <a:lstStyle/>
           <a:p>
-            <a:endParaRPr lang="en-US"/>
+            <a:r>
+              <a:rPr lang="fr-FR"/>
+              <a:t>Technologies utilisés</a:t>
+            </a:r>
+            <a:endParaRPr lang="en-US" dirty="0"/>
           </a:p>
         </p:txBody>
       </p:sp>
@@ -5638,7 +5722,7 @@
           <p:cNvPr id="3" name="Content Placeholder 2">
             <a:extLst>
               <a:ext uri="{FF2B5EF4-FFF2-40B4-BE49-F238E27FC236}">
-                <a16:creationId xmlns:a16="http://schemas.microsoft.com/office/drawing/2014/main" id="{8BC5174E-5CE4-40EB-AC41-9F2196CC07BD}"/>
+                <a16:creationId xmlns:a16="http://schemas.microsoft.com/office/drawing/2014/main" id="{7673A041-B6FE-4DE0-A6A1-151279EC2AFD}"/>
               </a:ext>
             </a:extLst>
           </p:cNvPr>
@@ -5654,14 +5738,56 @@
           <a:bodyPr/>
           <a:lstStyle/>
           <a:p>
-            <a:endParaRPr lang="en-US"/>
+            <a:r>
+              <a:rPr lang="fr-FR" dirty="0" err="1"/>
+              <a:t>Laravel</a:t>
+            </a:r>
+            <a:endParaRPr lang="fr-FR" dirty="0"/>
+          </a:p>
+          <a:p>
+            <a:r>
+              <a:rPr lang="fr-FR" dirty="0" err="1"/>
+              <a:t>Livewire</a:t>
+            </a:r>
+            <a:endParaRPr lang="fr-FR" dirty="0"/>
+          </a:p>
+          <a:p>
+            <a:r>
+              <a:rPr lang="fr-FR" dirty="0" err="1"/>
+              <a:t>TailwindCSS</a:t>
+            </a:r>
+            <a:endParaRPr lang="fr-FR" dirty="0"/>
+          </a:p>
+          <a:p>
+            <a:r>
+              <a:rPr lang="fr-FR" dirty="0"/>
+              <a:t>Bootstrap </a:t>
+            </a:r>
+          </a:p>
+          <a:p>
+            <a:r>
+              <a:rPr lang="fr-FR" dirty="0"/>
+              <a:t>Alpine.js</a:t>
+            </a:r>
+          </a:p>
+          <a:p>
+            <a:r>
+              <a:rPr lang="fr-FR" dirty="0"/>
+              <a:t>Carbon Library</a:t>
+            </a:r>
+          </a:p>
+          <a:p>
+            <a:endParaRPr lang="fr-FR" dirty="0"/>
+          </a:p>
+          <a:p>
+            <a:endParaRPr lang="en-US" dirty="0"/>
           </a:p>
         </p:txBody>
       </p:sp>
     </p:spTree>
     <p:extLst>
       <p:ext uri="{BB962C8B-B14F-4D97-AF65-F5344CB8AC3E}">
-        <p14:creationId xmlns:p14="http://schemas.microsoft.com/office/powerpoint/2010/main" val="986161817"/>
+        <p14:creationId xmlns:p14="http://schemas.microsoft.com/office/powerpoint/2010/main" val="3047287275"/>
       </p:ext>
     </p:extLst>
   </p:cSld>
@@ -5693,86 +5819,6 @@
           <p:cNvPr id="2" name="Title 1">
             <a:extLst>
               <a:ext uri="{FF2B5EF4-FFF2-40B4-BE49-F238E27FC236}">
-                <a16:creationId xmlns:a16="http://schemas.microsoft.com/office/drawing/2014/main" id="{99B0CD23-D85F-474F-88DD-9651CE5BE134}"/>
-              </a:ext>
-            </a:extLst>
-          </p:cNvPr>
-          <p:cNvSpPr>
-            <a:spLocks noGrp="1"/>
-          </p:cNvSpPr>
-          <p:nvPr>
-            <p:ph type="title"/>
-          </p:nvPr>
-        </p:nvSpPr>
-        <p:spPr/>
-        <p:txBody>
-          <a:bodyPr/>
-          <a:lstStyle/>
-          <a:p>
-            <a:endParaRPr lang="en-US"/>
-          </a:p>
-        </p:txBody>
-      </p:sp>
-      <p:sp>
-        <p:nvSpPr>
-          <p:cNvPr id="3" name="Content Placeholder 2">
-            <a:extLst>
-              <a:ext uri="{FF2B5EF4-FFF2-40B4-BE49-F238E27FC236}">
-                <a16:creationId xmlns:a16="http://schemas.microsoft.com/office/drawing/2014/main" id="{7673A041-B6FE-4DE0-A6A1-151279EC2AFD}"/>
-              </a:ext>
-            </a:extLst>
-          </p:cNvPr>
-          <p:cNvSpPr>
-            <a:spLocks noGrp="1"/>
-          </p:cNvSpPr>
-          <p:nvPr>
-            <p:ph idx="1"/>
-          </p:nvPr>
-        </p:nvSpPr>
-        <p:spPr/>
-        <p:txBody>
-          <a:bodyPr/>
-          <a:lstStyle/>
-          <a:p>
-            <a:endParaRPr lang="en-US"/>
-          </a:p>
-        </p:txBody>
-      </p:sp>
-    </p:spTree>
-    <p:extLst>
-      <p:ext uri="{BB962C8B-B14F-4D97-AF65-F5344CB8AC3E}">
-        <p14:creationId xmlns:p14="http://schemas.microsoft.com/office/powerpoint/2010/main" val="3047287275"/>
-      </p:ext>
-    </p:extLst>
-  </p:cSld>
-  <p:clrMapOvr>
-    <a:masterClrMapping/>
-  </p:clrMapOvr>
-</p:sld>
-</file>
-
-<file path=ppt/slides/slide23.xml><?xml version="1.0" encoding="utf-8"?>
-<p:sld xmlns:a="http://schemas.openxmlformats.org/drawingml/2006/main" xmlns:r="http://schemas.openxmlformats.org/officeDocument/2006/relationships" xmlns:p="http://schemas.openxmlformats.org/presentationml/2006/main">
-  <p:cSld>
-    <p:spTree>
-      <p:nvGrpSpPr>
-        <p:cNvPr id="1" name=""/>
-        <p:cNvGrpSpPr/>
-        <p:nvPr/>
-      </p:nvGrpSpPr>
-      <p:grpSpPr>
-        <a:xfrm>
-          <a:off x="0" y="0"/>
-          <a:ext cx="0" cy="0"/>
-          <a:chOff x="0" y="0"/>
-          <a:chExt cx="0" cy="0"/>
-        </a:xfrm>
-      </p:grpSpPr>
-      <p:sp>
-        <p:nvSpPr>
-          <p:cNvPr id="2" name="Title 1">
-            <a:extLst>
-              <a:ext uri="{FF2B5EF4-FFF2-40B4-BE49-F238E27FC236}">
                 <a16:creationId xmlns:a16="http://schemas.microsoft.com/office/drawing/2014/main" id="{A8452AB7-A91D-4B52-AE23-F4FB46CAFB30}"/>
               </a:ext>
             </a:extLst>
@@ -5831,7 +5877,7 @@
 </p:sld>
 </file>
 
-<file path=ppt/slides/slide24.xml><?xml version="1.0" encoding="utf-8"?>
+<file path=ppt/slides/slide23.xml><?xml version="1.0" encoding="utf-8"?>
 <p:sld xmlns:a="http://schemas.openxmlformats.org/drawingml/2006/main" xmlns:r="http://schemas.openxmlformats.org/officeDocument/2006/relationships" xmlns:p="http://schemas.openxmlformats.org/presentationml/2006/main">
   <p:cSld>
     <p:spTree>
@@ -5981,10 +6027,6 @@
             <a:pPr marL="0" indent="0">
               <a:buNone/>
             </a:pPr>
-            <a:r>
-              <a:rPr lang="fr-FR" dirty="0"/>
-              <a:t>ESTHETIQUE AUTO NORD SUD TÉTOUAN est une entreprise de lavage auto haute qualité et précise avec une large gamme de produits et services à la carte pour ses clients. l'entreprise a besoin d’un site web pour élargir sa présence dans le web, communiquer à propos de nouveautés de ses produits et services et permettre au client de réserver un créneau pour bénéficier de ses services sans se déplace.</a:t>
-            </a:r>
             <a:endParaRPr lang="en-US" dirty="0"/>
           </a:p>
         </p:txBody>
@@ -6199,21 +6241,66 @@
             <p:ph type="title"/>
           </p:nvPr>
         </p:nvSpPr>
-        <p:spPr/>
-        <p:txBody>
-          <a:bodyPr/>
-          <a:lstStyle/>
-          <a:p>
-            <a:endParaRPr lang="en-US"/>
+        <p:spPr>
+          <a:xfrm>
+            <a:off x="371669" y="-92075"/>
+            <a:ext cx="10515600" cy="1325563"/>
+          </a:xfrm>
+        </p:spPr>
+        <p:txBody>
+          <a:bodyPr/>
+          <a:lstStyle/>
+          <a:p>
+            <a:r>
+              <a:rPr lang="fr-FR" dirty="0"/>
+              <a:t>Conception et Modélisation</a:t>
+            </a:r>
+            <a:endParaRPr lang="en-US" dirty="0"/>
+          </a:p>
+        </p:txBody>
+      </p:sp>
+      <p:sp>
+        <p:nvSpPr>
+          <p:cNvPr id="3" name="TextBox 2">
+            <a:extLst>
+              <a:ext uri="{FF2B5EF4-FFF2-40B4-BE49-F238E27FC236}">
+                <a16:creationId xmlns:a16="http://schemas.microsoft.com/office/drawing/2014/main" id="{0B9C2530-1D7B-4736-8304-1385AFEBAD77}"/>
+              </a:ext>
+            </a:extLst>
+          </p:cNvPr>
+          <p:cNvSpPr txBox="1"/>
+          <p:nvPr/>
+        </p:nvSpPr>
+        <p:spPr>
+          <a:xfrm>
+            <a:off x="1101011" y="1716833"/>
+            <a:ext cx="2348785" cy="369332"/>
+          </a:xfrm>
+          <a:prstGeom prst="rect">
+            <a:avLst/>
+          </a:prstGeom>
+          <a:noFill/>
+        </p:spPr>
+        <p:txBody>
+          <a:bodyPr wrap="none" rtlCol="0">
+            <a:spAutoFit/>
+          </a:bodyPr>
+          <a:lstStyle/>
+          <a:p>
+            <a:r>
+              <a:rPr lang="fr-FR" dirty="0"/>
+              <a:t>Diagramme des classes</a:t>
+            </a:r>
+            <a:endParaRPr lang="en-US" dirty="0"/>
           </a:p>
         </p:txBody>
       </p:sp>
       <p:pic>
         <p:nvPicPr>
-          <p:cNvPr id="4" name="Content Placeholder 3">
-            <a:extLst>
-              <a:ext uri="{FF2B5EF4-FFF2-40B4-BE49-F238E27FC236}">
-                <a16:creationId xmlns:a16="http://schemas.microsoft.com/office/drawing/2014/main" id="{AAE1E542-29E6-4A4A-90E2-74ACD8CE5069}"/>
+          <p:cNvPr id="8" name="Content Placeholder 7">
+            <a:extLst>
+              <a:ext uri="{FF2B5EF4-FFF2-40B4-BE49-F238E27FC236}">
+                <a16:creationId xmlns:a16="http://schemas.microsoft.com/office/drawing/2014/main" id="{A2B5B4B3-2E30-415F-82D6-AA92CCD5615A}"/>
               </a:ext>
             </a:extLst>
           </p:cNvPr>
@@ -6238,12 +6325,9 @@
         </p:blipFill>
         <p:spPr>
           <a:xfrm>
-            <a:off x="3904527" y="1844675"/>
-            <a:ext cx="4382945" cy="4351338"/>
+            <a:off x="4043976" y="1825625"/>
+            <a:ext cx="4104048" cy="4351338"/>
           </a:xfrm>
-          <a:prstGeom prst="rect">
-            <a:avLst/>
-          </a:prstGeom>
         </p:spPr>
       </p:pic>
     </p:spTree>

</xml_diff>

<commit_message>
add products and szrvices modify class diagram for methods
</commit_message>
<xml_diff>
--- a/Presentation.pptx
+++ b/Presentation.pptx
@@ -13,9 +13,9 @@
     <p:sldId id="261" r:id="rId4"/>
     <p:sldId id="263" r:id="rId5"/>
     <p:sldId id="267" r:id="rId6"/>
-    <p:sldId id="265" r:id="rId7"/>
-    <p:sldId id="268" r:id="rId8"/>
-    <p:sldId id="266" r:id="rId9"/>
+    <p:sldId id="266" r:id="rId7"/>
+    <p:sldId id="265" r:id="rId8"/>
+    <p:sldId id="268" r:id="rId9"/>
     <p:sldId id="264" r:id="rId10"/>
     <p:sldId id="269" r:id="rId11"/>
     <p:sldId id="257" r:id="rId12"/>
@@ -143,9 +143,9 @@
         <p14:section name="Conception et Modélisation" id="{5199EF27-D06C-4BE0-8067-D9C8A1A35187}">
           <p14:sldIdLst>
             <p14:sldId id="267"/>
+            <p14:sldId id="266"/>
             <p14:sldId id="265"/>
             <p14:sldId id="268"/>
-            <p14:sldId id="266"/>
             <p14:sldId id="264"/>
             <p14:sldId id="269"/>
           </p14:sldIdLst>
@@ -4499,7 +4499,7 @@
         </p:blipFill>
         <p:spPr>
           <a:xfrm>
-            <a:off x="8642237" y="823956"/>
+            <a:off x="7802482" y="365125"/>
             <a:ext cx="1554276" cy="5868944"/>
           </a:xfrm>
           <a:prstGeom prst="rect">
@@ -4537,11 +4537,83 @@
         </p:blipFill>
         <p:spPr>
           <a:xfrm>
-            <a:off x="1989021" y="1916112"/>
+            <a:off x="1995487" y="1582759"/>
             <a:ext cx="3565757" cy="4351338"/>
           </a:xfrm>
         </p:spPr>
       </p:pic>
+      <p:sp>
+        <p:nvSpPr>
+          <p:cNvPr id="3" name="TextBox 2">
+            <a:extLst>
+              <a:ext uri="{FF2B5EF4-FFF2-40B4-BE49-F238E27FC236}">
+                <a16:creationId xmlns:a16="http://schemas.microsoft.com/office/drawing/2014/main" id="{C3E3E24A-AEE1-48B4-A3A5-BB2AB8AEFB81}"/>
+              </a:ext>
+            </a:extLst>
+          </p:cNvPr>
+          <p:cNvSpPr txBox="1"/>
+          <p:nvPr/>
+        </p:nvSpPr>
+        <p:spPr>
+          <a:xfrm>
+            <a:off x="3237723" y="6123543"/>
+            <a:ext cx="953915" cy="369332"/>
+          </a:xfrm>
+          <a:prstGeom prst="rect">
+            <a:avLst/>
+          </a:prstGeom>
+          <a:noFill/>
+        </p:spPr>
+        <p:txBody>
+          <a:bodyPr wrap="none" rtlCol="0">
+            <a:spAutoFit/>
+          </a:bodyPr>
+          <a:lstStyle/>
+          <a:p>
+            <a:r>
+              <a:rPr lang="fr-FR" dirty="0"/>
+              <a:t>Desktop</a:t>
+            </a:r>
+            <a:endParaRPr lang="en-US" dirty="0"/>
+          </a:p>
+        </p:txBody>
+      </p:sp>
+      <p:sp>
+        <p:nvSpPr>
+          <p:cNvPr id="6" name="TextBox 5">
+            <a:extLst>
+              <a:ext uri="{FF2B5EF4-FFF2-40B4-BE49-F238E27FC236}">
+                <a16:creationId xmlns:a16="http://schemas.microsoft.com/office/drawing/2014/main" id="{5CFF4E05-F44A-4010-9D59-FF5A71181E63}"/>
+              </a:ext>
+            </a:extLst>
+          </p:cNvPr>
+          <p:cNvSpPr txBox="1"/>
+          <p:nvPr/>
+        </p:nvSpPr>
+        <p:spPr>
+          <a:xfrm>
+            <a:off x="8000364" y="6297647"/>
+            <a:ext cx="846707" cy="369332"/>
+          </a:xfrm>
+          <a:prstGeom prst="rect">
+            <a:avLst/>
+          </a:prstGeom>
+          <a:noFill/>
+        </p:spPr>
+        <p:txBody>
+          <a:bodyPr wrap="none" rtlCol="0">
+            <a:spAutoFit/>
+          </a:bodyPr>
+          <a:lstStyle/>
+          <a:p>
+            <a:r>
+              <a:rPr lang="fr-FR" dirty="0"/>
+              <a:t>Mobile</a:t>
+            </a:r>
+            <a:endParaRPr lang="en-US" dirty="0"/>
+          </a:p>
+        </p:txBody>
+      </p:sp>
     </p:spTree>
     <p:extLst>
       <p:ext uri="{BB962C8B-B14F-4D97-AF65-F5344CB8AC3E}">
@@ -4632,7 +4704,7 @@
           <a:p>
             <a:r>
               <a:rPr lang="fr-FR" dirty="0"/>
-              <a:t>Workflow : </a:t>
+              <a:t>4.1 Présentation du Workflow</a:t>
             </a:r>
             <a:endParaRPr lang="en-US" dirty="0"/>
           </a:p>
@@ -4852,7 +4924,7 @@
         </p:blipFill>
         <p:spPr>
           <a:xfrm>
-            <a:off x="838200" y="2258133"/>
+            <a:off x="763555" y="1894240"/>
             <a:ext cx="10515600" cy="3486321"/>
           </a:xfrm>
           <a:prstGeom prst="rect">
@@ -4911,7 +4983,19 @@
           <a:bodyPr/>
           <a:lstStyle/>
           <a:p>
-            <a:endParaRPr lang="en-US"/>
+            <a:r>
+              <a:rPr lang="fr-FR" dirty="0"/>
+              <a:t>Kanban </a:t>
+            </a:r>
+            <a:r>
+              <a:rPr lang="fr-FR" dirty="0" err="1"/>
+              <a:t>board</a:t>
+            </a:r>
+            <a:r>
+              <a:rPr lang="fr-FR" dirty="0"/>
+              <a:t> de projet</a:t>
+            </a:r>
+            <a:endParaRPr lang="en-US" dirty="0"/>
           </a:p>
         </p:txBody>
       </p:sp>
@@ -4998,6 +5082,18 @@
           <a:bodyPr/>
           <a:lstStyle/>
           <a:p>
+            <a:r>
+              <a:rPr lang="fr-FR" dirty="0"/>
+              <a:t>Kanban </a:t>
+            </a:r>
+            <a:r>
+              <a:rPr lang="fr-FR" dirty="0" err="1"/>
+              <a:t>board</a:t>
+            </a:r>
+            <a:r>
+              <a:rPr lang="fr-FR" dirty="0"/>
+              <a:t> : après merge</a:t>
+            </a:r>
             <a:endParaRPr lang="en-US" dirty="0"/>
           </a:p>
         </p:txBody>
@@ -5087,7 +5183,7 @@
           <a:p>
             <a:r>
               <a:rPr lang="fr-FR" dirty="0"/>
-              <a:t>Plateforme Finale</a:t>
+              <a:t>4.2 Plateforme Finale</a:t>
             </a:r>
             <a:endParaRPr lang="en-US" dirty="0"/>
           </a:p>
@@ -5179,7 +5275,7 @@
           <a:p>
             <a:r>
               <a:rPr lang="fr-FR" dirty="0"/>
-              <a:t>Conclusion et perspectives</a:t>
+              <a:t>5. Conclusion et perspectives</a:t>
             </a:r>
             <a:endParaRPr lang="en-US" dirty="0"/>
           </a:p>
@@ -5217,13 +5313,13 @@
             </a:r>
             <a:r>
               <a:rPr lang="fr-FR" sz="2000" dirty="0"/>
-              <a:t> Tétouan représenté a fait un retour positif sur le produit final et compte le déployer le plus tôt possible ( réunion sera programmé en Novembre)</a:t>
+              <a:t> Tétouan représenté par Mr. Abderrahim a fait un retour positif sur la conception et compte le déployer le plus tôt possible ( réunion sera programmé avec l’un des associés)</a:t>
             </a:r>
           </a:p>
           <a:p>
             <a:r>
               <a:rPr lang="fr-FR" sz="2000" dirty="0"/>
-              <a:t>L’application de réservation est en version beta on compte l’essayer un moment après déploiement avant de faire des modifications selon le retour des utilisateurs (associées </a:t>
+              <a:t>L’application de réservation est en version beta on compte l’essayer un moment après déploiement avant de faire des modifications selon le retour des utilisateurs (associés </a:t>
             </a:r>
             <a:r>
               <a:rPr lang="fr-FR" sz="2000" dirty="0" err="1"/>
@@ -5245,13 +5341,24 @@
           <a:p>
             <a:r>
               <a:rPr lang="fr-FR" sz="2000" dirty="0"/>
-              <a:t>Ajouter un CRUD côté admin pour la partie réservation et un email de confirmation </a:t>
-            </a:r>
+              <a:t>Ajouter confirmation par email et option d’impression de facture en </a:t>
+            </a:r>
+            <a:r>
+              <a:rPr lang="fr-FR" sz="2000" dirty="0" err="1"/>
+              <a:t>pdf</a:t>
+            </a:r>
+            <a:endParaRPr lang="fr-FR" sz="2000" dirty="0"/>
           </a:p>
           <a:p>
             <a:r>
               <a:rPr lang="fr-FR" sz="2000" dirty="0"/>
-              <a:t>Ajouter une application de chat live ( réunion sera programmé en Novembre)</a:t>
+              <a:t>Ajouter un CRUD côté admin pour l’application de réservation  </a:t>
+            </a:r>
+          </a:p>
+          <a:p>
+            <a:r>
+              <a:rPr lang="fr-FR" sz="2000" dirty="0"/>
+              <a:t>Ajouter une application de chat live</a:t>
             </a:r>
           </a:p>
           <a:p>
@@ -5390,73 +5497,295 @@
           </a:p>
         </p:txBody>
       </p:sp>
-      <p:sp>
-        <p:nvSpPr>
-          <p:cNvPr id="3" name="Content Placeholder 2">
-            <a:extLst>
-              <a:ext uri="{FF2B5EF4-FFF2-40B4-BE49-F238E27FC236}">
-                <a16:creationId xmlns:a16="http://schemas.microsoft.com/office/drawing/2014/main" id="{7673A041-B6FE-4DE0-A6A1-151279EC2AFD}"/>
-              </a:ext>
-            </a:extLst>
-          </p:cNvPr>
-          <p:cNvSpPr>
-            <a:spLocks noGrp="1"/>
-          </p:cNvSpPr>
-          <p:nvPr>
-            <p:ph idx="1"/>
-          </p:nvPr>
-        </p:nvSpPr>
-        <p:spPr/>
-        <p:txBody>
-          <a:bodyPr/>
-          <a:lstStyle/>
-          <a:p>
-            <a:r>
-              <a:rPr lang="fr-FR" dirty="0" err="1"/>
-              <a:t>Laravel</a:t>
-            </a:r>
-            <a:endParaRPr lang="fr-FR" dirty="0"/>
-          </a:p>
-          <a:p>
-            <a:r>
-              <a:rPr lang="fr-FR" dirty="0" err="1"/>
-              <a:t>Livewire</a:t>
-            </a:r>
-            <a:endParaRPr lang="fr-FR" dirty="0"/>
-          </a:p>
-          <a:p>
-            <a:r>
-              <a:rPr lang="fr-FR" dirty="0" err="1"/>
-              <a:t>TailwindCSS</a:t>
-            </a:r>
-            <a:endParaRPr lang="fr-FR" dirty="0"/>
-          </a:p>
-          <a:p>
-            <a:r>
-              <a:rPr lang="fr-FR" dirty="0"/>
-              <a:t>Bootstrap </a:t>
-            </a:r>
-          </a:p>
-          <a:p>
-            <a:r>
-              <a:rPr lang="fr-FR" dirty="0"/>
-              <a:t>Alpine.js</a:t>
-            </a:r>
-          </a:p>
-          <a:p>
-            <a:r>
-              <a:rPr lang="fr-FR" dirty="0"/>
-              <a:t>Carbon Library</a:t>
-            </a:r>
-          </a:p>
-          <a:p>
-            <a:endParaRPr lang="fr-FR" dirty="0"/>
-          </a:p>
-          <a:p>
-            <a:endParaRPr lang="en-US" dirty="0"/>
-          </a:p>
-        </p:txBody>
-      </p:sp>
+      <p:graphicFrame>
+        <p:nvGraphicFramePr>
+          <p:cNvPr id="4" name="Table 3">
+            <a:extLst>
+              <a:ext uri="{FF2B5EF4-FFF2-40B4-BE49-F238E27FC236}">
+                <a16:creationId xmlns:a16="http://schemas.microsoft.com/office/drawing/2014/main" id="{79100C48-80F5-4C4A-B5D1-68E416DC353C}"/>
+              </a:ext>
+            </a:extLst>
+          </p:cNvPr>
+          <p:cNvGraphicFramePr>
+            <a:graphicFrameLocks noGrp="1"/>
+          </p:cNvGraphicFramePr>
+          <p:nvPr>
+            <p:extLst>
+              <p:ext uri="{D42A27DB-BD31-4B8C-83A1-F6EECF244321}">
+                <p14:modId xmlns:p14="http://schemas.microsoft.com/office/powerpoint/2010/main" val="1916880072"/>
+              </p:ext>
+            </p:extLst>
+          </p:nvPr>
+        </p:nvGraphicFramePr>
+        <p:xfrm>
+          <a:off x="1350865" y="1848670"/>
+          <a:ext cx="8903478" cy="3806118"/>
+        </p:xfrm>
+        <a:graphic>
+          <a:graphicData uri="http://schemas.openxmlformats.org/drawingml/2006/table">
+            <a:tbl>
+              <a:tblPr firstRow="1" bandRow="1">
+                <a:tableStyleId>{5C22544A-7EE6-4342-B048-85BDC9FD1C3A}</a:tableStyleId>
+              </a:tblPr>
+              <a:tblGrid>
+                <a:gridCol w="4451739">
+                  <a:extLst>
+                    <a:ext uri="{9D8B030D-6E8A-4147-A177-3AD203B41FA5}">
+                      <a16:colId xmlns:a16="http://schemas.microsoft.com/office/drawing/2014/main" val="692498852"/>
+                    </a:ext>
+                  </a:extLst>
+                </a:gridCol>
+                <a:gridCol w="4451739">
+                  <a:extLst>
+                    <a:ext uri="{9D8B030D-6E8A-4147-A177-3AD203B41FA5}">
+                      <a16:colId xmlns:a16="http://schemas.microsoft.com/office/drawing/2014/main" val="1445950475"/>
+                    </a:ext>
+                  </a:extLst>
+                </a:gridCol>
+              </a:tblGrid>
+              <a:tr h="527673">
+                <a:tc>
+                  <a:txBody>
+                    <a:bodyPr/>
+                    <a:lstStyle/>
+                    <a:p>
+                      <a:r>
+                        <a:rPr lang="fr-FR" dirty="0"/>
+                        <a:t>Technologie</a:t>
+                      </a:r>
+                      <a:endParaRPr lang="en-US" dirty="0"/>
+                    </a:p>
+                  </a:txBody>
+                  <a:tcPr/>
+                </a:tc>
+                <a:tc>
+                  <a:txBody>
+                    <a:bodyPr/>
+                    <a:lstStyle/>
+                    <a:p>
+                      <a:r>
+                        <a:rPr lang="fr-FR" dirty="0"/>
+                        <a:t>Documentation officielle</a:t>
+                      </a:r>
+                      <a:endParaRPr lang="en-US" dirty="0"/>
+                    </a:p>
+                  </a:txBody>
+                  <a:tcPr/>
+                </a:tc>
+                <a:extLst>
+                  <a:ext uri="{0D108BD9-81ED-4DB2-BD59-A6C34878D82A}">
+                    <a16:rowId xmlns:a16="http://schemas.microsoft.com/office/drawing/2014/main" val="3161592217"/>
+                  </a:ext>
+                </a:extLst>
+              </a:tr>
+              <a:tr h="527673">
+                <a:tc>
+                  <a:txBody>
+                    <a:bodyPr/>
+                    <a:lstStyle/>
+                    <a:p>
+                      <a:r>
+                        <a:rPr lang="fr-FR" dirty="0" err="1"/>
+                        <a:t>Laravel</a:t>
+                      </a:r>
+                      <a:endParaRPr lang="en-US" dirty="0"/>
+                    </a:p>
+                  </a:txBody>
+                  <a:tcPr/>
+                </a:tc>
+                <a:tc>
+                  <a:txBody>
+                    <a:bodyPr/>
+                    <a:lstStyle/>
+                    <a:p>
+                      <a:r>
+                        <a:rPr lang="en-US" dirty="0"/>
+                        <a:t>https://laravel.com/docs/8.x/</a:t>
+                      </a:r>
+                    </a:p>
+                  </a:txBody>
+                  <a:tcPr/>
+                </a:tc>
+                <a:extLst>
+                  <a:ext uri="{0D108BD9-81ED-4DB2-BD59-A6C34878D82A}">
+                    <a16:rowId xmlns:a16="http://schemas.microsoft.com/office/drawing/2014/main" val="1846950929"/>
+                  </a:ext>
+                </a:extLst>
+              </a:tr>
+              <a:tr h="527673">
+                <a:tc>
+                  <a:txBody>
+                    <a:bodyPr/>
+                    <a:lstStyle/>
+                    <a:p>
+                      <a:r>
+                        <a:rPr lang="fr-FR" dirty="0" err="1"/>
+                        <a:t>Livewire</a:t>
+                      </a:r>
+                      <a:endParaRPr lang="en-US" dirty="0"/>
+                    </a:p>
+                  </a:txBody>
+                  <a:tcPr/>
+                </a:tc>
+                <a:tc>
+                  <a:txBody>
+                    <a:bodyPr/>
+                    <a:lstStyle/>
+                    <a:p>
+                      <a:r>
+                        <a:rPr lang="en-US" dirty="0"/>
+                        <a:t>https://laravel-livewire.com/</a:t>
+                      </a:r>
+                    </a:p>
+                  </a:txBody>
+                  <a:tcPr/>
+                </a:tc>
+                <a:extLst>
+                  <a:ext uri="{0D108BD9-81ED-4DB2-BD59-A6C34878D82A}">
+                    <a16:rowId xmlns:a16="http://schemas.microsoft.com/office/drawing/2014/main" val="4105805609"/>
+                  </a:ext>
+                </a:extLst>
+              </a:tr>
+              <a:tr h="527673">
+                <a:tc>
+                  <a:txBody>
+                    <a:bodyPr/>
+                    <a:lstStyle/>
+                    <a:p>
+                      <a:r>
+                        <a:rPr lang="fr-FR" dirty="0" err="1"/>
+                        <a:t>TailwindCSS</a:t>
+                      </a:r>
+                      <a:endParaRPr lang="en-US" dirty="0"/>
+                    </a:p>
+                  </a:txBody>
+                  <a:tcPr/>
+                </a:tc>
+                <a:tc>
+                  <a:txBody>
+                    <a:bodyPr/>
+                    <a:lstStyle/>
+                    <a:p>
+                      <a:r>
+                        <a:rPr lang="en-US" dirty="0"/>
+                        <a:t>https://tailwindcss.com/docs</a:t>
+                      </a:r>
+                    </a:p>
+                  </a:txBody>
+                  <a:tcPr/>
+                </a:tc>
+                <a:extLst>
+                  <a:ext uri="{0D108BD9-81ED-4DB2-BD59-A6C34878D82A}">
+                    <a16:rowId xmlns:a16="http://schemas.microsoft.com/office/drawing/2014/main" val="1765458653"/>
+                  </a:ext>
+                </a:extLst>
+              </a:tr>
+              <a:tr h="527673">
+                <a:tc>
+                  <a:txBody>
+                    <a:bodyPr/>
+                    <a:lstStyle/>
+                    <a:p>
+                      <a:r>
+                        <a:rPr lang="fr-FR" dirty="0"/>
+                        <a:t>Bootstrap</a:t>
+                      </a:r>
+                      <a:endParaRPr lang="en-US" dirty="0"/>
+                    </a:p>
+                  </a:txBody>
+                  <a:tcPr/>
+                </a:tc>
+                <a:tc>
+                  <a:txBody>
+                    <a:bodyPr/>
+                    <a:lstStyle/>
+                    <a:p>
+                      <a:r>
+                        <a:rPr lang="en-US" dirty="0"/>
+                        <a:t>https://getbootstrap.com/docs/4.6/getting-started/introduction/</a:t>
+                      </a:r>
+                    </a:p>
+                  </a:txBody>
+                  <a:tcPr/>
+                </a:tc>
+                <a:extLst>
+                  <a:ext uri="{0D108BD9-81ED-4DB2-BD59-A6C34878D82A}">
+                    <a16:rowId xmlns:a16="http://schemas.microsoft.com/office/drawing/2014/main" val="711951845"/>
+                  </a:ext>
+                </a:extLst>
+              </a:tr>
+              <a:tr h="527673">
+                <a:tc>
+                  <a:txBody>
+                    <a:bodyPr/>
+                    <a:lstStyle/>
+                    <a:p>
+                      <a:r>
+                        <a:rPr lang="fr-FR" dirty="0"/>
+                        <a:t>Alpine.JS</a:t>
+                      </a:r>
+                      <a:endParaRPr lang="en-US" dirty="0"/>
+                    </a:p>
+                  </a:txBody>
+                  <a:tcPr/>
+                </a:tc>
+                <a:tc>
+                  <a:txBody>
+                    <a:bodyPr/>
+                    <a:lstStyle/>
+                    <a:p>
+                      <a:r>
+                        <a:rPr lang="en-US" dirty="0"/>
+                        <a:t>https://alpinejs.dev/start-here</a:t>
+                      </a:r>
+                    </a:p>
+                  </a:txBody>
+                  <a:tcPr/>
+                </a:tc>
+                <a:extLst>
+                  <a:ext uri="{0D108BD9-81ED-4DB2-BD59-A6C34878D82A}">
+                    <a16:rowId xmlns:a16="http://schemas.microsoft.com/office/drawing/2014/main" val="1530865732"/>
+                  </a:ext>
+                </a:extLst>
+              </a:tr>
+              <a:tr h="527673">
+                <a:tc>
+                  <a:txBody>
+                    <a:bodyPr/>
+                    <a:lstStyle/>
+                    <a:p>
+                      <a:r>
+                        <a:rPr lang="fr-FR" dirty="0"/>
+                        <a:t>Carbon Library</a:t>
+                      </a:r>
+                      <a:endParaRPr lang="en-US" dirty="0"/>
+                    </a:p>
+                  </a:txBody>
+                  <a:tcPr/>
+                </a:tc>
+                <a:tc>
+                  <a:txBody>
+                    <a:bodyPr/>
+                    <a:lstStyle/>
+                    <a:p>
+                      <a:r>
+                        <a:rPr lang="en-US" dirty="0"/>
+                        <a:t>https://carbon.nesbot.com/docs/</a:t>
+                      </a:r>
+                    </a:p>
+                  </a:txBody>
+                  <a:tcPr/>
+                </a:tc>
+                <a:extLst>
+                  <a:ext uri="{0D108BD9-81ED-4DB2-BD59-A6C34878D82A}">
+                    <a16:rowId xmlns:a16="http://schemas.microsoft.com/office/drawing/2014/main" val="3720113467"/>
+                  </a:ext>
+                </a:extLst>
+              </a:tr>
+            </a:tbl>
+          </a:graphicData>
+        </a:graphic>
+      </p:graphicFrame>
     </p:spTree>
     <p:extLst>
       <p:ext uri="{BB962C8B-B14F-4D97-AF65-F5344CB8AC3E}">
@@ -5540,7 +5869,7 @@
         </p:spPr>
         <p:txBody>
           <a:bodyPr>
-            <a:normAutofit fontScale="92500" lnSpcReduction="20000"/>
+            <a:normAutofit fontScale="92500" lnSpcReduction="10000"/>
           </a:bodyPr>
           <a:lstStyle/>
           <a:p>
@@ -5550,20 +5879,8 @@
             </a:pPr>
             <a:r>
               <a:rPr lang="fr-FR" b="1" dirty="0"/>
-              <a:t>Problématique</a:t>
-            </a:r>
-            <a:endParaRPr lang="en-US" b="1" dirty="0"/>
-          </a:p>
-          <a:p>
-            <a:pPr marL="971550" lvl="1" indent="-514350">
-              <a:buFont typeface="+mj-lt"/>
-              <a:buAutoNum type="arabicPeriod"/>
-            </a:pPr>
-            <a:r>
-              <a:rPr lang="fr-FR" dirty="0"/>
-              <a:t>Description de cahier de charge ( de préférence schématisé)</a:t>
-            </a:r>
-            <a:endParaRPr lang="en-US" dirty="0"/>
+              <a:t>Cahier de Charge </a:t>
+            </a:r>
           </a:p>
           <a:p>
             <a:pPr marL="514350" indent="-514350">
@@ -5870,7 +6187,7 @@
         <p:spPr>
           <a:xfrm>
             <a:off x="7623402" y="3054184"/>
-            <a:ext cx="4077478" cy="923330"/>
+            <a:ext cx="4077478" cy="1200329"/>
           </a:xfrm>
           <a:prstGeom prst="rect">
             <a:avLst/>
@@ -5896,7 +6213,7 @@
             </a:pPr>
             <a:r>
               <a:rPr lang="fr-FR" dirty="0"/>
-              <a:t>Application de gestion contenu (CMS) </a:t>
+              <a:t>Application de gestion de contenu (CMS) </a:t>
             </a:r>
           </a:p>
           <a:p>
@@ -6025,7 +6342,7 @@
             <a:pPr fontAlgn="base"/>
             <a:r>
               <a:rPr lang="fr-FR" dirty="0"/>
-              <a:t>L’admin peut publier des articles sur les nouveautés de domaine auto et des annonces à propos d’activité de l’entreprise au profit de ses clients actuels/potentiels </a:t>
+              <a:t>L’admin peut publier des articles sur les nouveautés de domaine et des annonces à propos de son activité au profit de ses clients actuels/potentiels </a:t>
             </a:r>
           </a:p>
           <a:p>
@@ -6184,10 +6501,10 @@
       </p:sp>
       <p:pic>
         <p:nvPicPr>
-          <p:cNvPr id="8" name="Content Placeholder 7">
-            <a:extLst>
-              <a:ext uri="{FF2B5EF4-FFF2-40B4-BE49-F238E27FC236}">
-                <a16:creationId xmlns:a16="http://schemas.microsoft.com/office/drawing/2014/main" id="{A2B5B4B3-2E30-415F-82D6-AA92CCD5615A}"/>
+          <p:cNvPr id="12" name="Content Placeholder 11">
+            <a:extLst>
+              <a:ext uri="{FF2B5EF4-FFF2-40B4-BE49-F238E27FC236}">
+                <a16:creationId xmlns:a16="http://schemas.microsoft.com/office/drawing/2014/main" id="{1DDD922C-E2A1-4905-B511-0AFB426C2F3C}"/>
               </a:ext>
             </a:extLst>
           </p:cNvPr>
@@ -6212,8 +6529,8 @@
         </p:blipFill>
         <p:spPr>
           <a:xfrm>
-            <a:off x="3900194" y="303974"/>
-            <a:ext cx="8291806" cy="6453294"/>
+            <a:off x="4058815" y="729166"/>
+            <a:ext cx="7632441" cy="6221803"/>
           </a:xfrm>
         </p:spPr>
       </p:pic>
@@ -6252,7 +6569,7 @@
           <p:cNvPr id="2" name="Title 1">
             <a:extLst>
               <a:ext uri="{FF2B5EF4-FFF2-40B4-BE49-F238E27FC236}">
-                <a16:creationId xmlns:a16="http://schemas.microsoft.com/office/drawing/2014/main" id="{76D775E0-1917-4057-B9A0-28248C62D464}"/>
+                <a16:creationId xmlns:a16="http://schemas.microsoft.com/office/drawing/2014/main" id="{523BC38F-29C5-4920-98E7-B38E1A35A751}"/>
               </a:ext>
             </a:extLst>
           </p:cNvPr>
@@ -6270,54 +6587,18 @@
           <a:p>
             <a:r>
               <a:rPr lang="fr-FR" dirty="0"/>
-              <a:t>Diagramme Entité-Association (ERD)</a:t>
+              <a:t>Diagramme de cas d’utilisation</a:t>
             </a:r>
             <a:endParaRPr lang="en-US" dirty="0"/>
-          </a:p>
-        </p:txBody>
-      </p:sp>
-      <p:sp>
-        <p:nvSpPr>
-          <p:cNvPr id="5" name="TextBox 4">
-            <a:extLst>
-              <a:ext uri="{FF2B5EF4-FFF2-40B4-BE49-F238E27FC236}">
-                <a16:creationId xmlns:a16="http://schemas.microsoft.com/office/drawing/2014/main" id="{1098BCDA-84CE-43F2-BBC9-6B6163681A95}"/>
-              </a:ext>
-            </a:extLst>
-          </p:cNvPr>
-          <p:cNvSpPr txBox="1"/>
-          <p:nvPr/>
-        </p:nvSpPr>
-        <p:spPr>
-          <a:xfrm>
-            <a:off x="838200" y="1459855"/>
-            <a:ext cx="2232662" cy="461665"/>
-          </a:xfrm>
-          <a:prstGeom prst="rect">
-            <a:avLst/>
-          </a:prstGeom>
-          <a:noFill/>
-        </p:spPr>
-        <p:txBody>
-          <a:bodyPr wrap="none" rtlCol="0">
-            <a:spAutoFit/>
-          </a:bodyPr>
-          <a:lstStyle/>
-          <a:p>
-            <a:r>
-              <a:rPr lang="fr-FR" sz="2400" dirty="0"/>
-              <a:t>Application CMS</a:t>
-            </a:r>
-            <a:endParaRPr lang="en-US" sz="2400" dirty="0"/>
           </a:p>
         </p:txBody>
       </p:sp>
       <p:pic>
         <p:nvPicPr>
-          <p:cNvPr id="8" name="Content Placeholder 7">
-            <a:extLst>
-              <a:ext uri="{FF2B5EF4-FFF2-40B4-BE49-F238E27FC236}">
-                <a16:creationId xmlns:a16="http://schemas.microsoft.com/office/drawing/2014/main" id="{E232940C-9D69-4FFB-9B54-2E0925F06032}"/>
+          <p:cNvPr id="6" name="Content Placeholder 3">
+            <a:extLst>
+              <a:ext uri="{FF2B5EF4-FFF2-40B4-BE49-F238E27FC236}">
+                <a16:creationId xmlns:a16="http://schemas.microsoft.com/office/drawing/2014/main" id="{D29CE711-6A5F-4EFB-A5F2-72B79085D284}"/>
               </a:ext>
             </a:extLst>
           </p:cNvPr>
@@ -6342,15 +6623,18 @@
         </p:blipFill>
         <p:spPr>
           <a:xfrm>
-            <a:off x="3937518" y="1459855"/>
-            <a:ext cx="7641771" cy="5028865"/>
+            <a:off x="1525099" y="1825625"/>
+            <a:ext cx="9141801" cy="4351338"/>
           </a:xfrm>
+          <a:prstGeom prst="rect">
+            <a:avLst/>
+          </a:prstGeom>
         </p:spPr>
       </p:pic>
     </p:spTree>
     <p:extLst>
       <p:ext uri="{BB962C8B-B14F-4D97-AF65-F5344CB8AC3E}">
-        <p14:creationId xmlns:p14="http://schemas.microsoft.com/office/powerpoint/2010/main" val="1327964343"/>
+        <p14:creationId xmlns:p14="http://schemas.microsoft.com/office/powerpoint/2010/main" val="1665507981"/>
       </p:ext>
     </p:extLst>
   </p:cSld>
@@ -6379,10 +6663,39 @@
       </p:grpSpPr>
       <p:sp>
         <p:nvSpPr>
-          <p:cNvPr id="4" name="TextBox 3">
-            <a:extLst>
-              <a:ext uri="{FF2B5EF4-FFF2-40B4-BE49-F238E27FC236}">
-                <a16:creationId xmlns:a16="http://schemas.microsoft.com/office/drawing/2014/main" id="{0F56D686-E839-42BD-8217-0F8A40229394}"/>
+          <p:cNvPr id="2" name="Title 1">
+            <a:extLst>
+              <a:ext uri="{FF2B5EF4-FFF2-40B4-BE49-F238E27FC236}">
+                <a16:creationId xmlns:a16="http://schemas.microsoft.com/office/drawing/2014/main" id="{76D775E0-1917-4057-B9A0-28248C62D464}"/>
+              </a:ext>
+            </a:extLst>
+          </p:cNvPr>
+          <p:cNvSpPr>
+            <a:spLocks noGrp="1"/>
+          </p:cNvSpPr>
+          <p:nvPr>
+            <p:ph type="title"/>
+          </p:nvPr>
+        </p:nvSpPr>
+        <p:spPr/>
+        <p:txBody>
+          <a:bodyPr/>
+          <a:lstStyle/>
+          <a:p>
+            <a:r>
+              <a:rPr lang="fr-FR" dirty="0"/>
+              <a:t>Diagramme Entité-Association (ERD)</a:t>
+            </a:r>
+            <a:endParaRPr lang="en-US" dirty="0"/>
+          </a:p>
+        </p:txBody>
+      </p:sp>
+      <p:sp>
+        <p:nvSpPr>
+          <p:cNvPr id="5" name="TextBox 4">
+            <a:extLst>
+              <a:ext uri="{FF2B5EF4-FFF2-40B4-BE49-F238E27FC236}">
+                <a16:creationId xmlns:a16="http://schemas.microsoft.com/office/drawing/2014/main" id="{1098BCDA-84CE-43F2-BBC9-6B6163681A95}"/>
               </a:ext>
             </a:extLst>
           </p:cNvPr>
@@ -6391,8 +6704,8 @@
         </p:nvSpPr>
         <p:spPr>
           <a:xfrm>
-            <a:off x="763554" y="1363960"/>
-            <a:ext cx="3203569" cy="461665"/>
+            <a:off x="838200" y="1459855"/>
+            <a:ext cx="2232662" cy="461665"/>
           </a:xfrm>
           <a:prstGeom prst="rect">
             <a:avLst/>
@@ -6407,52 +6720,18 @@
           <a:p>
             <a:r>
               <a:rPr lang="fr-FR" sz="2400" dirty="0"/>
-              <a:t>Application réservations</a:t>
+              <a:t>Application CMS</a:t>
             </a:r>
             <a:endParaRPr lang="en-US" sz="2400" dirty="0"/>
-          </a:p>
-        </p:txBody>
-      </p:sp>
-      <p:sp>
-        <p:nvSpPr>
-          <p:cNvPr id="5" name="Title 1">
-            <a:extLst>
-              <a:ext uri="{FF2B5EF4-FFF2-40B4-BE49-F238E27FC236}">
-                <a16:creationId xmlns:a16="http://schemas.microsoft.com/office/drawing/2014/main" id="{97F0B80B-8D5E-4B5B-A090-6B487FE3D7FE}"/>
-              </a:ext>
-            </a:extLst>
-          </p:cNvPr>
-          <p:cNvSpPr>
-            <a:spLocks noGrp="1"/>
-          </p:cNvSpPr>
-          <p:nvPr>
-            <p:ph type="title"/>
-          </p:nvPr>
-        </p:nvSpPr>
-        <p:spPr>
-          <a:xfrm>
-            <a:off x="838200" y="365125"/>
-            <a:ext cx="10515600" cy="1325563"/>
-          </a:xfrm>
-        </p:spPr>
-        <p:txBody>
-          <a:bodyPr/>
-          <a:lstStyle/>
-          <a:p>
-            <a:r>
-              <a:rPr lang="fr-FR" dirty="0"/>
-              <a:t>Diagramme Entité-Association (ERD)</a:t>
-            </a:r>
-            <a:endParaRPr lang="en-US" dirty="0"/>
           </a:p>
         </p:txBody>
       </p:sp>
       <p:pic>
         <p:nvPicPr>
-          <p:cNvPr id="7" name="Content Placeholder 6">
-            <a:extLst>
-              <a:ext uri="{FF2B5EF4-FFF2-40B4-BE49-F238E27FC236}">
-                <a16:creationId xmlns:a16="http://schemas.microsoft.com/office/drawing/2014/main" id="{10C6B04B-AE65-425D-AB11-DA13AD509186}"/>
+          <p:cNvPr id="12" name="Content Placeholder 11">
+            <a:extLst>
+              <a:ext uri="{FF2B5EF4-FFF2-40B4-BE49-F238E27FC236}">
+                <a16:creationId xmlns:a16="http://schemas.microsoft.com/office/drawing/2014/main" id="{B7F1C524-29CB-4C58-A3DA-B8146F6321BD}"/>
               </a:ext>
             </a:extLst>
           </p:cNvPr>
@@ -6477,15 +6756,15 @@
         </p:blipFill>
         <p:spPr>
           <a:xfrm>
-            <a:off x="2909193" y="1825625"/>
-            <a:ext cx="6373614" cy="4351338"/>
+            <a:off x="3451358" y="1280139"/>
+            <a:ext cx="7745901" cy="5400579"/>
           </a:xfrm>
         </p:spPr>
       </p:pic>
     </p:spTree>
     <p:extLst>
       <p:ext uri="{BB962C8B-B14F-4D97-AF65-F5344CB8AC3E}">
-        <p14:creationId xmlns:p14="http://schemas.microsoft.com/office/powerpoint/2010/main" val="462728450"/>
+        <p14:creationId xmlns:p14="http://schemas.microsoft.com/office/powerpoint/2010/main" val="1327964343"/>
       </p:ext>
     </p:extLst>
   </p:cSld>
@@ -6514,10 +6793,46 @@
       </p:grpSpPr>
       <p:sp>
         <p:nvSpPr>
-          <p:cNvPr id="2" name="Title 1">
-            <a:extLst>
-              <a:ext uri="{FF2B5EF4-FFF2-40B4-BE49-F238E27FC236}">
-                <a16:creationId xmlns:a16="http://schemas.microsoft.com/office/drawing/2014/main" id="{523BC38F-29C5-4920-98E7-B38E1A35A751}"/>
+          <p:cNvPr id="4" name="TextBox 3">
+            <a:extLst>
+              <a:ext uri="{FF2B5EF4-FFF2-40B4-BE49-F238E27FC236}">
+                <a16:creationId xmlns:a16="http://schemas.microsoft.com/office/drawing/2014/main" id="{0F56D686-E839-42BD-8217-0F8A40229394}"/>
+              </a:ext>
+            </a:extLst>
+          </p:cNvPr>
+          <p:cNvSpPr txBox="1"/>
+          <p:nvPr/>
+        </p:nvSpPr>
+        <p:spPr>
+          <a:xfrm>
+            <a:off x="763554" y="1363960"/>
+            <a:ext cx="3203569" cy="461665"/>
+          </a:xfrm>
+          <a:prstGeom prst="rect">
+            <a:avLst/>
+          </a:prstGeom>
+          <a:noFill/>
+        </p:spPr>
+        <p:txBody>
+          <a:bodyPr wrap="none" rtlCol="0">
+            <a:spAutoFit/>
+          </a:bodyPr>
+          <a:lstStyle/>
+          <a:p>
+            <a:r>
+              <a:rPr lang="fr-FR" sz="2400" dirty="0"/>
+              <a:t>Application réservations</a:t>
+            </a:r>
+            <a:endParaRPr lang="en-US" sz="2400" dirty="0"/>
+          </a:p>
+        </p:txBody>
+      </p:sp>
+      <p:sp>
+        <p:nvSpPr>
+          <p:cNvPr id="5" name="Title 1">
+            <a:extLst>
+              <a:ext uri="{FF2B5EF4-FFF2-40B4-BE49-F238E27FC236}">
+                <a16:creationId xmlns:a16="http://schemas.microsoft.com/office/drawing/2014/main" id="{97F0B80B-8D5E-4B5B-A090-6B487FE3D7FE}"/>
               </a:ext>
             </a:extLst>
           </p:cNvPr>
@@ -6528,14 +6843,19 @@
             <p:ph type="title"/>
           </p:nvPr>
         </p:nvSpPr>
-        <p:spPr/>
+        <p:spPr>
+          <a:xfrm>
+            <a:off x="838200" y="365125"/>
+            <a:ext cx="10515600" cy="1325563"/>
+          </a:xfrm>
+        </p:spPr>
         <p:txBody>
           <a:bodyPr/>
           <a:lstStyle/>
           <a:p>
             <a:r>
               <a:rPr lang="fr-FR" dirty="0"/>
-              <a:t>Diagramme de cas d’utilisation</a:t>
+              <a:t>Diagramme Entité-Association (ERD)</a:t>
             </a:r>
             <a:endParaRPr lang="en-US" dirty="0"/>
           </a:p>
@@ -6543,10 +6863,10 @@
       </p:sp>
       <p:pic>
         <p:nvPicPr>
-          <p:cNvPr id="6" name="Content Placeholder 3">
-            <a:extLst>
-              <a:ext uri="{FF2B5EF4-FFF2-40B4-BE49-F238E27FC236}">
-                <a16:creationId xmlns:a16="http://schemas.microsoft.com/office/drawing/2014/main" id="{D29CE711-6A5F-4EFB-A5F2-72B79085D284}"/>
+          <p:cNvPr id="7" name="Content Placeholder 6">
+            <a:extLst>
+              <a:ext uri="{FF2B5EF4-FFF2-40B4-BE49-F238E27FC236}">
+                <a16:creationId xmlns:a16="http://schemas.microsoft.com/office/drawing/2014/main" id="{10C6B04B-AE65-425D-AB11-DA13AD509186}"/>
               </a:ext>
             </a:extLst>
           </p:cNvPr>
@@ -6571,18 +6891,15 @@
         </p:blipFill>
         <p:spPr>
           <a:xfrm>
-            <a:off x="1525099" y="1825625"/>
-            <a:ext cx="9141801" cy="4351338"/>
+            <a:off x="3515681" y="1690688"/>
+            <a:ext cx="7177199" cy="4899955"/>
           </a:xfrm>
-          <a:prstGeom prst="rect">
-            <a:avLst/>
-          </a:prstGeom>
         </p:spPr>
       </p:pic>
     </p:spTree>
     <p:extLst>
       <p:ext uri="{BB962C8B-B14F-4D97-AF65-F5344CB8AC3E}">
-        <p14:creationId xmlns:p14="http://schemas.microsoft.com/office/powerpoint/2010/main" val="1665507981"/>
+        <p14:creationId xmlns:p14="http://schemas.microsoft.com/office/powerpoint/2010/main" val="462728450"/>
       </p:ext>
     </p:extLst>
   </p:cSld>

</xml_diff>